<commit_message>
Final changes before deadline. References were add, notebook ran top to bottom, added README, and few minor changes.
</commit_message>
<xml_diff>
--- a/imgs/imgCreator.pptx
+++ b/imgs/imgCreator.pptx
@@ -104,6 +104,11 @@
       </a:defRPr>
     </a:lvl9pPr>
   </p:defaultTextStyle>
+  <p:extLst>
+    <p:ext uri="{EFAFB233-063F-42B5-8137-9DF3F51BA10A}">
+      <p15:sldGuideLst xmlns:p15="http://schemas.microsoft.com/office/powerpoint/2012/main"/>
+    </p:ext>
+  </p:extLst>
 </p:presentation>
 </file>
 
@@ -256,7 +261,7 @@
           <a:p>
             <a:fld id="{68E97186-19F8-41DF-A622-E38BD267583B}" type="datetimeFigureOut">
               <a:rPr lang="en-IE" smtClean="0"/>
-              <a:t>06/11/2020</a:t>
+              <a:t>08/01/2021</a:t>
             </a:fld>
             <a:endParaRPr lang="en-IE"/>
           </a:p>
@@ -456,7 +461,7 @@
           <a:p>
             <a:fld id="{68E97186-19F8-41DF-A622-E38BD267583B}" type="datetimeFigureOut">
               <a:rPr lang="en-IE" smtClean="0"/>
-              <a:t>06/11/2020</a:t>
+              <a:t>08/01/2021</a:t>
             </a:fld>
             <a:endParaRPr lang="en-IE"/>
           </a:p>
@@ -666,7 +671,7 @@
           <a:p>
             <a:fld id="{68E97186-19F8-41DF-A622-E38BD267583B}" type="datetimeFigureOut">
               <a:rPr lang="en-IE" smtClean="0"/>
-              <a:t>06/11/2020</a:t>
+              <a:t>08/01/2021</a:t>
             </a:fld>
             <a:endParaRPr lang="en-IE"/>
           </a:p>
@@ -866,7 +871,7 @@
           <a:p>
             <a:fld id="{68E97186-19F8-41DF-A622-E38BD267583B}" type="datetimeFigureOut">
               <a:rPr lang="en-IE" smtClean="0"/>
-              <a:t>06/11/2020</a:t>
+              <a:t>08/01/2021</a:t>
             </a:fld>
             <a:endParaRPr lang="en-IE"/>
           </a:p>
@@ -1142,7 +1147,7 @@
           <a:p>
             <a:fld id="{68E97186-19F8-41DF-A622-E38BD267583B}" type="datetimeFigureOut">
               <a:rPr lang="en-IE" smtClean="0"/>
-              <a:t>06/11/2020</a:t>
+              <a:t>08/01/2021</a:t>
             </a:fld>
             <a:endParaRPr lang="en-IE"/>
           </a:p>
@@ -1410,7 +1415,7 @@
           <a:p>
             <a:fld id="{68E97186-19F8-41DF-A622-E38BD267583B}" type="datetimeFigureOut">
               <a:rPr lang="en-IE" smtClean="0"/>
-              <a:t>06/11/2020</a:t>
+              <a:t>08/01/2021</a:t>
             </a:fld>
             <a:endParaRPr lang="en-IE"/>
           </a:p>
@@ -1825,7 +1830,7 @@
           <a:p>
             <a:fld id="{68E97186-19F8-41DF-A622-E38BD267583B}" type="datetimeFigureOut">
               <a:rPr lang="en-IE" smtClean="0"/>
-              <a:t>06/11/2020</a:t>
+              <a:t>08/01/2021</a:t>
             </a:fld>
             <a:endParaRPr lang="en-IE"/>
           </a:p>
@@ -1967,7 +1972,7 @@
           <a:p>
             <a:fld id="{68E97186-19F8-41DF-A622-E38BD267583B}" type="datetimeFigureOut">
               <a:rPr lang="en-IE" smtClean="0"/>
-              <a:t>06/11/2020</a:t>
+              <a:t>08/01/2021</a:t>
             </a:fld>
             <a:endParaRPr lang="en-IE"/>
           </a:p>
@@ -2080,7 +2085,7 @@
           <a:p>
             <a:fld id="{68E97186-19F8-41DF-A622-E38BD267583B}" type="datetimeFigureOut">
               <a:rPr lang="en-IE" smtClean="0"/>
-              <a:t>06/11/2020</a:t>
+              <a:t>08/01/2021</a:t>
             </a:fld>
             <a:endParaRPr lang="en-IE"/>
           </a:p>
@@ -2393,7 +2398,7 @@
           <a:p>
             <a:fld id="{68E97186-19F8-41DF-A622-E38BD267583B}" type="datetimeFigureOut">
               <a:rPr lang="en-IE" smtClean="0"/>
-              <a:t>06/11/2020</a:t>
+              <a:t>08/01/2021</a:t>
             </a:fld>
             <a:endParaRPr lang="en-IE"/>
           </a:p>
@@ -2682,7 +2687,7 @@
           <a:p>
             <a:fld id="{68E97186-19F8-41DF-A622-E38BD267583B}" type="datetimeFigureOut">
               <a:rPr lang="en-IE" smtClean="0"/>
-              <a:t>06/11/2020</a:t>
+              <a:t>08/01/2021</a:t>
             </a:fld>
             <a:endParaRPr lang="en-IE"/>
           </a:p>
@@ -2925,7 +2930,7 @@
           <a:p>
             <a:fld id="{68E97186-19F8-41DF-A622-E38BD267583B}" type="datetimeFigureOut">
               <a:rPr lang="en-IE" smtClean="0"/>
-              <a:t>06/11/2020</a:t>
+              <a:t>08/01/2021</a:t>
             </a:fld>
             <a:endParaRPr lang="en-IE"/>
           </a:p>
@@ -3709,8 +3714,8 @@
             <a:lstStyle/>
             <a:p>
               <a:r>
-                <a:rPr lang="en-GB" dirty="0"/>
-                <a:t>(7, 20)</a:t>
+                <a:rPr lang="en-GB"/>
+                <a:t>(20, 7)</a:t>
               </a:r>
               <a:endParaRPr lang="en-IE" dirty="0"/>
             </a:p>
@@ -3746,7 +3751,7 @@
             <a:p>
               <a:r>
                 <a:rPr lang="en-GB" dirty="0"/>
-                <a:t>(8, 20)</a:t>
+                <a:t>(20, 8)</a:t>
               </a:r>
               <a:endParaRPr lang="en-IE" dirty="0"/>
             </a:p>

</xml_diff>